<commit_message>
stuffing around with basic stuff
</commit_message>
<xml_diff>
--- a/Dejan/Fundamentals/Fundamentals-Presentation.pptx
+++ b/Dejan/Fundamentals/Fundamentals-Presentation.pptx
@@ -310,7 +310,7 @@
             <a:fld id="{1D8BD707-D9CF-40AE-B4C6-C98DA3205C09}" type="datetimeFigureOut">
               <a:rPr lang="en-US" smtClean="0"/>
               <a:pPr/>
-              <a:t>4/17/2015</a:t>
+              <a:t>4/19/2015</a:t>
             </a:fld>
             <a:endParaRPr lang="en-US"/>
           </a:p>
@@ -482,7 +482,7 @@
             <a:fld id="{1D8BD707-D9CF-40AE-B4C6-C98DA3205C09}" type="datetimeFigureOut">
               <a:rPr lang="en-US" smtClean="0"/>
               <a:pPr/>
-              <a:t>4/17/2015</a:t>
+              <a:t>4/19/2015</a:t>
             </a:fld>
             <a:endParaRPr lang="en-US"/>
           </a:p>
@@ -664,7 +664,7 @@
             <a:fld id="{1D8BD707-D9CF-40AE-B4C6-C98DA3205C09}" type="datetimeFigureOut">
               <a:rPr lang="en-US" smtClean="0"/>
               <a:pPr/>
-              <a:t>4/17/2015</a:t>
+              <a:t>4/19/2015</a:t>
             </a:fld>
             <a:endParaRPr lang="en-US"/>
           </a:p>
@@ -836,7 +836,7 @@
             <a:fld id="{1D8BD707-D9CF-40AE-B4C6-C98DA3205C09}" type="datetimeFigureOut">
               <a:rPr lang="en-US" smtClean="0"/>
               <a:pPr/>
-              <a:t>4/17/2015</a:t>
+              <a:t>4/19/2015</a:t>
             </a:fld>
             <a:endParaRPr lang="en-US"/>
           </a:p>
@@ -1084,7 +1084,7 @@
             <a:fld id="{1D8BD707-D9CF-40AE-B4C6-C98DA3205C09}" type="datetimeFigureOut">
               <a:rPr lang="en-US" smtClean="0"/>
               <a:pPr/>
-              <a:t>4/17/2015</a:t>
+              <a:t>4/19/2015</a:t>
             </a:fld>
             <a:endParaRPr lang="en-US"/>
           </a:p>
@@ -1374,7 +1374,7 @@
             <a:fld id="{1D8BD707-D9CF-40AE-B4C6-C98DA3205C09}" type="datetimeFigureOut">
               <a:rPr lang="en-US" smtClean="0"/>
               <a:pPr/>
-              <a:t>4/17/2015</a:t>
+              <a:t>4/19/2015</a:t>
             </a:fld>
             <a:endParaRPr lang="en-US"/>
           </a:p>
@@ -1798,7 +1798,7 @@
             <a:fld id="{1D8BD707-D9CF-40AE-B4C6-C98DA3205C09}" type="datetimeFigureOut">
               <a:rPr lang="en-US" smtClean="0"/>
               <a:pPr/>
-              <a:t>4/17/2015</a:t>
+              <a:t>4/19/2015</a:t>
             </a:fld>
             <a:endParaRPr lang="en-US"/>
           </a:p>
@@ -1918,7 +1918,7 @@
             <a:fld id="{1D8BD707-D9CF-40AE-B4C6-C98DA3205C09}" type="datetimeFigureOut">
               <a:rPr lang="en-US" smtClean="0"/>
               <a:pPr/>
-              <a:t>4/17/2015</a:t>
+              <a:t>4/19/2015</a:t>
             </a:fld>
             <a:endParaRPr lang="en-US"/>
           </a:p>
@@ -2015,7 +2015,7 @@
             <a:fld id="{1D8BD707-D9CF-40AE-B4C6-C98DA3205C09}" type="datetimeFigureOut">
               <a:rPr lang="en-US" smtClean="0"/>
               <a:pPr/>
-              <a:t>4/17/2015</a:t>
+              <a:t>4/19/2015</a:t>
             </a:fld>
             <a:endParaRPr lang="en-US"/>
           </a:p>
@@ -2294,7 +2294,7 @@
             <a:fld id="{1D8BD707-D9CF-40AE-B4C6-C98DA3205C09}" type="datetimeFigureOut">
               <a:rPr lang="en-US" smtClean="0"/>
               <a:pPr/>
-              <a:t>4/17/2015</a:t>
+              <a:t>4/19/2015</a:t>
             </a:fld>
             <a:endParaRPr lang="en-US"/>
           </a:p>
@@ -2549,7 +2549,7 @@
             <a:fld id="{1D8BD707-D9CF-40AE-B4C6-C98DA3205C09}" type="datetimeFigureOut">
               <a:rPr lang="en-US" smtClean="0"/>
               <a:pPr/>
-              <a:t>4/17/2015</a:t>
+              <a:t>4/19/2015</a:t>
             </a:fld>
             <a:endParaRPr lang="en-US"/>
           </a:p>
@@ -2764,7 +2764,7 @@
             <a:fld id="{1D8BD707-D9CF-40AE-B4C6-C98DA3205C09}" type="datetimeFigureOut">
               <a:rPr lang="en-US" smtClean="0"/>
               <a:pPr/>
-              <a:t>4/17/2015</a:t>
+              <a:t>4/19/2015</a:t>
             </a:fld>
             <a:endParaRPr lang="en-US"/>
           </a:p>
@@ -3377,19 +3377,7 @@
           <a:p>
             <a:r>
               <a:rPr lang="en-AU" dirty="0"/>
-              <a:t>Html </a:t>
-            </a:r>
-            <a:r>
-              <a:rPr lang="en-AU" dirty="0" smtClean="0"/>
-              <a:t>(web) without </a:t>
-            </a:r>
-            <a:r>
-              <a:rPr lang="en-AU" dirty="0"/>
-              <a:t>JavaScript? You’re </a:t>
-            </a:r>
-            <a:r>
-              <a:rPr lang="en-AU" dirty="0" smtClean="0"/>
-              <a:t>kidding right ? </a:t>
+              <a:t>Html (web) without JavaScript? You’re kidding right ? </a:t>
             </a:r>
             <a:r>
               <a:rPr lang="en-AU" dirty="0" smtClean="0">
@@ -3402,6 +3390,12 @@
           <a:p>
             <a:r>
               <a:rPr lang="en-AU" dirty="0" smtClean="0"/>
+              <a:t>Compile now using JS Hint and JS Lint</a:t>
+            </a:r>
+          </a:p>
+          <a:p>
+            <a:r>
+              <a:rPr lang="en-AU" dirty="0" smtClean="0"/>
               <a:t>So </a:t>
             </a:r>
             <a:r>
@@ -3426,8 +3420,9 @@
             </a:r>
             <a:r>
               <a:rPr lang="en-AU" dirty="0" smtClean="0"/>
-              <a:t>VS</a:t>
-            </a:r>
+              <a:t>VS, even ONLINE editors!</a:t>
+            </a:r>
+            <a:endParaRPr lang="en-AU" dirty="0" smtClean="0"/>
           </a:p>
           <a:p>
             <a:r>
@@ -3438,20 +3433,23 @@
           <a:p>
             <a:r>
               <a:rPr lang="en-AU" dirty="0" smtClean="0"/>
-              <a:t>Browser support improving. But still a battle..</a:t>
-            </a:r>
-          </a:p>
-          <a:p>
+              <a:t>JavaScript </a:t>
+            </a:r>
             <a:r>
               <a:rPr lang="en-AU" dirty="0" smtClean="0"/>
-              <a:t>JavaScript on the server. Why not?</a:t>
+              <a:t>on the server. Why not?</a:t>
             </a:r>
           </a:p>
           <a:p>
             <a:r>
               <a:rPr lang="en-AU" dirty="0" smtClean="0"/>
-              <a:t>Fast, powerful</a:t>
-            </a:r>
+              <a:t>Browsers support </a:t>
+            </a:r>
+            <a:r>
+              <a:rPr lang="en-AU" smtClean="0"/>
+              <a:t>getting better</a:t>
+            </a:r>
+            <a:endParaRPr lang="en-AU" dirty="0" smtClean="0"/>
           </a:p>
           <a:p>
             <a:endParaRPr lang="en-AU" dirty="0" smtClean="0"/>
@@ -3633,8 +3631,17 @@
           <a:p>
             <a:r>
               <a:rPr lang="en-AU" dirty="0" smtClean="0"/>
-              <a:t>Numbers</a:t>
-            </a:r>
+              <a:t>Strings, Numbers</a:t>
+            </a:r>
+            <a:r>
+              <a:rPr lang="en-AU" dirty="0"/>
+              <a:t>, D</a:t>
+            </a:r>
+            <a:r>
+              <a:rPr lang="en-AU" dirty="0" smtClean="0"/>
+              <a:t>ates</a:t>
+            </a:r>
+            <a:endParaRPr lang="en-AU" dirty="0" smtClean="0"/>
           </a:p>
           <a:p>
             <a:r>
@@ -3645,13 +3652,11 @@
           <a:p>
             <a:r>
               <a:rPr lang="en-AU" dirty="0" smtClean="0"/>
-              <a:t>Strings</a:t>
-            </a:r>
-          </a:p>
-          <a:p>
+              <a:t>Functions </a:t>
+            </a:r>
             <a:r>
               <a:rPr lang="en-AU" dirty="0"/>
-              <a:t>Functions and </a:t>
+              <a:t>and </a:t>
             </a:r>
             <a:r>
               <a:rPr lang="en-AU" dirty="0" smtClean="0"/>

</xml_diff>

<commit_message>
made some fixes to the presentations and typos
</commit_message>
<xml_diff>
--- a/Dejan/Fundamentals/Fundamentals-Presentation.pptx
+++ b/Dejan/Fundamentals/Fundamentals-Presentation.pptx
@@ -310,7 +310,7 @@
             <a:fld id="{1D8BD707-D9CF-40AE-B4C6-C98DA3205C09}" type="datetimeFigureOut">
               <a:rPr lang="en-US" smtClean="0"/>
               <a:pPr/>
-              <a:t>4/19/2015</a:t>
+              <a:t>4/20/2015</a:t>
             </a:fld>
             <a:endParaRPr lang="en-US"/>
           </a:p>
@@ -482,7 +482,7 @@
             <a:fld id="{1D8BD707-D9CF-40AE-B4C6-C98DA3205C09}" type="datetimeFigureOut">
               <a:rPr lang="en-US" smtClean="0"/>
               <a:pPr/>
-              <a:t>4/19/2015</a:t>
+              <a:t>4/20/2015</a:t>
             </a:fld>
             <a:endParaRPr lang="en-US"/>
           </a:p>
@@ -664,7 +664,7 @@
             <a:fld id="{1D8BD707-D9CF-40AE-B4C6-C98DA3205C09}" type="datetimeFigureOut">
               <a:rPr lang="en-US" smtClean="0"/>
               <a:pPr/>
-              <a:t>4/19/2015</a:t>
+              <a:t>4/20/2015</a:t>
             </a:fld>
             <a:endParaRPr lang="en-US"/>
           </a:p>
@@ -836,7 +836,7 @@
             <a:fld id="{1D8BD707-D9CF-40AE-B4C6-C98DA3205C09}" type="datetimeFigureOut">
               <a:rPr lang="en-US" smtClean="0"/>
               <a:pPr/>
-              <a:t>4/19/2015</a:t>
+              <a:t>4/20/2015</a:t>
             </a:fld>
             <a:endParaRPr lang="en-US"/>
           </a:p>
@@ -1084,7 +1084,7 @@
             <a:fld id="{1D8BD707-D9CF-40AE-B4C6-C98DA3205C09}" type="datetimeFigureOut">
               <a:rPr lang="en-US" smtClean="0"/>
               <a:pPr/>
-              <a:t>4/19/2015</a:t>
+              <a:t>4/20/2015</a:t>
             </a:fld>
             <a:endParaRPr lang="en-US"/>
           </a:p>
@@ -1374,7 +1374,7 @@
             <a:fld id="{1D8BD707-D9CF-40AE-B4C6-C98DA3205C09}" type="datetimeFigureOut">
               <a:rPr lang="en-US" smtClean="0"/>
               <a:pPr/>
-              <a:t>4/19/2015</a:t>
+              <a:t>4/20/2015</a:t>
             </a:fld>
             <a:endParaRPr lang="en-US"/>
           </a:p>
@@ -1798,7 +1798,7 @@
             <a:fld id="{1D8BD707-D9CF-40AE-B4C6-C98DA3205C09}" type="datetimeFigureOut">
               <a:rPr lang="en-US" smtClean="0"/>
               <a:pPr/>
-              <a:t>4/19/2015</a:t>
+              <a:t>4/20/2015</a:t>
             </a:fld>
             <a:endParaRPr lang="en-US"/>
           </a:p>
@@ -1918,7 +1918,7 @@
             <a:fld id="{1D8BD707-D9CF-40AE-B4C6-C98DA3205C09}" type="datetimeFigureOut">
               <a:rPr lang="en-US" smtClean="0"/>
               <a:pPr/>
-              <a:t>4/19/2015</a:t>
+              <a:t>4/20/2015</a:t>
             </a:fld>
             <a:endParaRPr lang="en-US"/>
           </a:p>
@@ -2015,7 +2015,7 @@
             <a:fld id="{1D8BD707-D9CF-40AE-B4C6-C98DA3205C09}" type="datetimeFigureOut">
               <a:rPr lang="en-US" smtClean="0"/>
               <a:pPr/>
-              <a:t>4/19/2015</a:t>
+              <a:t>4/20/2015</a:t>
             </a:fld>
             <a:endParaRPr lang="en-US"/>
           </a:p>
@@ -2294,7 +2294,7 @@
             <a:fld id="{1D8BD707-D9CF-40AE-B4C6-C98DA3205C09}" type="datetimeFigureOut">
               <a:rPr lang="en-US" smtClean="0"/>
               <a:pPr/>
-              <a:t>4/19/2015</a:t>
+              <a:t>4/20/2015</a:t>
             </a:fld>
             <a:endParaRPr lang="en-US"/>
           </a:p>
@@ -2549,7 +2549,7 @@
             <a:fld id="{1D8BD707-D9CF-40AE-B4C6-C98DA3205C09}" type="datetimeFigureOut">
               <a:rPr lang="en-US" smtClean="0"/>
               <a:pPr/>
-              <a:t>4/19/2015</a:t>
+              <a:t>4/20/2015</a:t>
             </a:fld>
             <a:endParaRPr lang="en-US"/>
           </a:p>
@@ -2764,7 +2764,7 @@
             <a:fld id="{1D8BD707-D9CF-40AE-B4C6-C98DA3205C09}" type="datetimeFigureOut">
               <a:rPr lang="en-US" smtClean="0"/>
               <a:pPr/>
-              <a:t>4/19/2015</a:t>
+              <a:t>4/20/2015</a:t>
             </a:fld>
             <a:endParaRPr lang="en-US"/>
           </a:p>
@@ -3422,7 +3422,6 @@
               <a:rPr lang="en-AU" dirty="0" smtClean="0"/>
               <a:t>VS, even ONLINE editors!</a:t>
             </a:r>
-            <a:endParaRPr lang="en-AU" dirty="0" smtClean="0"/>
           </a:p>
           <a:p>
             <a:r>
@@ -3433,11 +3432,7 @@
           <a:p>
             <a:r>
               <a:rPr lang="en-AU" dirty="0" smtClean="0"/>
-              <a:t>JavaScript </a:t>
-            </a:r>
-            <a:r>
-              <a:rPr lang="en-AU" dirty="0" smtClean="0"/>
-              <a:t>on the server. Why not?</a:t>
+              <a:t>JavaScript on the server. Why not?</a:t>
             </a:r>
           </a:p>
           <a:p>
@@ -3526,19 +3521,25 @@
           <a:p>
             <a:r>
               <a:rPr lang="en-AU" dirty="0" smtClean="0"/>
-              <a:t>JavaScript is ‘interpreted’</a:t>
-            </a:r>
-          </a:p>
-          <a:p>
+              <a:t>JavaScript is </a:t>
+            </a:r>
+            <a:r>
+              <a:rPr lang="en-AU" smtClean="0"/>
+              <a:t>‘</a:t>
+            </a:r>
+            <a:r>
+              <a:rPr lang="en-AU" smtClean="0"/>
+              <a:t>interpreted’</a:t>
+            </a:r>
+          </a:p>
+          <a:p>
+            <a:r>
+              <a:rPr lang="en-AU" smtClean="0"/>
+              <a:t>Loading </a:t>
+            </a:r>
             <a:r>
               <a:rPr lang="en-AU" dirty="0" smtClean="0"/>
-              <a:t>Order matters</a:t>
-            </a:r>
-          </a:p>
-          <a:p>
-            <a:r>
-              <a:rPr lang="en-AU" dirty="0" smtClean="0"/>
-              <a:t>Loading scripts using the script tag</a:t>
+              <a:t>scripts using the script tag</a:t>
             </a:r>
           </a:p>
           <a:p>
@@ -3641,7 +3642,6 @@
               <a:rPr lang="en-AU" dirty="0" smtClean="0"/>
               <a:t>ates</a:t>
             </a:r>
-            <a:endParaRPr lang="en-AU" dirty="0" smtClean="0"/>
           </a:p>
           <a:p>
             <a:r>

</xml_diff>